<commit_message>
[doc] (plan de test): update gestion profil
</commit_message>
<xml_diff>
--- a/WIP/plan de test/planTestGestionProfil.pptx
+++ b/WIP/plan de test/planTestGestionProfil.pptx
@@ -3788,8 +3788,8 @@
           </p:nvSpPr>
           <p:spPr>
             <a:xfrm>
-              <a:off x="178838" y="2392897"/>
-              <a:ext cx="5810680" cy="2072204"/>
+              <a:off x="204905" y="2185511"/>
+              <a:ext cx="5810680" cy="2351854"/>
             </a:xfrm>
             <a:custGeom>
               <a:avLst/>
@@ -3989,7 +3989,38 @@
                   <a:ea typeface="+mn-ea"/>
                   <a:cs typeface="+mn-cs"/>
                 </a:rPr>
-                <a:t>Entrer dans un champ type email</a:t>
+                <a:t>Entrer dans un champ type email pour l’email</a:t>
+              </a:r>
+            </a:p>
+            <a:p>
+              <a:pPr defTabSz="2400300">
+                <a:lnSpc>
+                  <a:spcPct val="90000"/>
+                </a:lnSpc>
+                <a:spcBef>
+                  <a:spcPct val="0"/>
+                </a:spcBef>
+                <a:spcAft>
+                  <a:spcPct val="35000"/>
+                </a:spcAft>
+                <a:defRPr/>
+              </a:pPr>
+              <a:r>
+                <a:rPr kumimoji="0" lang="fr-FR" sz="1200" b="0" i="0" u="none" strike="noStrike" kern="1200" cap="none" spc="0" normalizeH="0" baseline="0" noProof="0" dirty="0">
+                  <a:ln>
+                    <a:noFill/>
+                  </a:ln>
+                  <a:solidFill>
+                    <a:prstClr val="white"/>
+                  </a:solidFill>
+                  <a:effectLst/>
+                  <a:uLnTx/>
+                  <a:uFillTx/>
+                  <a:latin typeface="Calibri" panose="020F0502020204030204"/>
+                  <a:ea typeface="+mn-ea"/>
+                  <a:cs typeface="+mn-cs"/>
+                </a:rPr>
+                <a:t>Entrer dans un champ type non-email pour l’email</a:t>
               </a:r>
             </a:p>
             <a:p>
@@ -4025,7 +4056,69 @@
                   <a:ea typeface="+mn-ea"/>
                   <a:cs typeface="+mn-cs"/>
                 </a:rPr>
-                <a:t>Entrer dans un champ type charactères </a:t>
+                <a:t>Entrer dans un champ type charactères pour l’adresse et lieu</a:t>
+              </a:r>
+            </a:p>
+            <a:p>
+              <a:pPr defTabSz="2400300">
+                <a:lnSpc>
+                  <a:spcPct val="90000"/>
+                </a:lnSpc>
+                <a:spcBef>
+                  <a:spcPct val="0"/>
+                </a:spcBef>
+                <a:spcAft>
+                  <a:spcPct val="35000"/>
+                </a:spcAft>
+                <a:defRPr/>
+              </a:pPr>
+              <a:r>
+                <a:rPr kumimoji="0" lang="fr-FR" sz="1200" b="0" i="0" u="none" strike="noStrike" kern="1200" cap="none" spc="0" normalizeH="0" baseline="0" noProof="0" dirty="0">
+                  <a:ln>
+                    <a:noFill/>
+                  </a:ln>
+                  <a:solidFill>
+                    <a:prstClr val="white"/>
+                  </a:solidFill>
+                  <a:effectLst/>
+                  <a:uLnTx/>
+                  <a:uFillTx/>
+                  <a:latin typeface="Calibri" panose="020F0502020204030204"/>
+                  <a:ea typeface="+mn-ea"/>
+                  <a:cs typeface="+mn-cs"/>
+                </a:rPr>
+                <a:t>Entrer dans un champ type non-charactères pour l’adresse et lieu</a:t>
+              </a:r>
+            </a:p>
+            <a:p>
+              <a:pPr defTabSz="2400300">
+                <a:lnSpc>
+                  <a:spcPct val="90000"/>
+                </a:lnSpc>
+                <a:spcBef>
+                  <a:spcPct val="0"/>
+                </a:spcBef>
+                <a:spcAft>
+                  <a:spcPct val="35000"/>
+                </a:spcAft>
+                <a:defRPr/>
+              </a:pPr>
+              <a:r>
+                <a:rPr kumimoji="0" lang="fr-FR" sz="1200" b="0" i="0" u="none" strike="noStrike" kern="1200" cap="none" spc="0" normalizeH="0" baseline="0" noProof="0" dirty="0">
+                  <a:ln>
+                    <a:noFill/>
+                  </a:ln>
+                  <a:solidFill>
+                    <a:prstClr val="white"/>
+                  </a:solidFill>
+                  <a:effectLst/>
+                  <a:uLnTx/>
+                  <a:uFillTx/>
+                  <a:latin typeface="Calibri" panose="020F0502020204030204"/>
+                  <a:ea typeface="+mn-ea"/>
+                  <a:cs typeface="+mn-cs"/>
+                </a:rPr>
+                <a:t>Entrer dans champ type numérique pour le NPA</a:t>
               </a:r>
             </a:p>
             <a:p>
@@ -4061,7 +4154,7 @@
                   <a:ea typeface="+mn-ea"/>
                   <a:cs typeface="+mn-cs"/>
                 </a:rPr>
-                <a:t>Entrer dans champ type numérique</a:t>
+                <a:t>Entrer dans champ type non-numérique pour le NPA</a:t>
               </a:r>
             </a:p>
             <a:p>
@@ -5970,6 +6063,26 @@
 </file>
 
 <file path=customXml/item1.xml><?xml version="1.0" encoding="utf-8"?>
+<?mso-contentType ?>
+<FormTemplates xmlns="http://schemas.microsoft.com/sharepoint/v3/contenttype/forms">
+  <Display>DocumentLibraryForm</Display>
+  <Edit>DocumentLibraryForm</Edit>
+  <New>DocumentLibraryForm</New>
+</FormTemplates>
+</file>
+
+<file path=customXml/item2.xml><?xml version="1.0" encoding="utf-8"?>
+<p:properties xmlns:p="http://schemas.microsoft.com/office/2006/metadata/properties" xmlns:xsi="http://www.w3.org/2001/XMLSchema-instance" xmlns:pc="http://schemas.microsoft.com/office/infopath/2007/PartnerControls">
+  <documentManagement>
+    <lcf76f155ced4ddcb4097134ff3c332f xmlns="b5cf4370-ac38-4b9e-9836-ef6f5df64f24">
+      <Terms xmlns="http://schemas.microsoft.com/office/infopath/2007/PartnerControls"/>
+    </lcf76f155ced4ddcb4097134ff3c332f>
+    <TaxCatchAll xmlns="eefa3612-053e-497a-ae76-8a76877f5e22" xsi:nil="true"/>
+  </documentManagement>
+</p:properties>
+</file>
+
+<file path=customXml/item3.xml><?xml version="1.0" encoding="utf-8"?>
 <ct:contentTypeSchema xmlns:ct="http://schemas.microsoft.com/office/2006/metadata/contentType" xmlns:ma="http://schemas.microsoft.com/office/2006/metadata/properties/metaAttributes" ct:_="" ma:_="" ma:contentTypeName="Document" ma:contentTypeID="0x01010080C9F2488912074FB587B9AD9ADAE5BB" ma:contentTypeVersion="11" ma:contentTypeDescription="Crée un document." ma:contentTypeScope="" ma:versionID="1bebaa2d391e7c30de2dcb588a772684">
   <xsd:schema xmlns:xsd="http://www.w3.org/2001/XMLSchema" xmlns:xs="http://www.w3.org/2001/XMLSchema" xmlns:p="http://schemas.microsoft.com/office/2006/metadata/properties" xmlns:ns2="b5cf4370-ac38-4b9e-9836-ef6f5df64f24" xmlns:ns3="eefa3612-053e-497a-ae76-8a76877f5e22" targetNamespace="http://schemas.microsoft.com/office/2006/metadata/properties" ma:root="true" ma:fieldsID="071e4af5f84e298b60331b8e79120627" ns2:_="" ns3:_="">
     <xsd:import namespace="b5cf4370-ac38-4b9e-9836-ef6f5df64f24"/>
@@ -6164,27 +6277,26 @@
 </ct:contentTypeSchema>
 </file>
 
-<file path=customXml/item2.xml><?xml version="1.0" encoding="utf-8"?>
-<p:properties xmlns:p="http://schemas.microsoft.com/office/2006/metadata/properties" xmlns:xsi="http://www.w3.org/2001/XMLSchema-instance" xmlns:pc="http://schemas.microsoft.com/office/infopath/2007/PartnerControls">
-  <documentManagement>
-    <lcf76f155ced4ddcb4097134ff3c332f xmlns="b5cf4370-ac38-4b9e-9836-ef6f5df64f24">
-      <Terms xmlns="http://schemas.microsoft.com/office/infopath/2007/PartnerControls"/>
-    </lcf76f155ced4ddcb4097134ff3c332f>
-    <TaxCatchAll xmlns="eefa3612-053e-497a-ae76-8a76877f5e22" xsi:nil="true"/>
-  </documentManagement>
-</p:properties>
+<file path=customXml/itemProps1.xml><?xml version="1.0" encoding="utf-8"?>
+<ds:datastoreItem xmlns:ds="http://schemas.openxmlformats.org/officeDocument/2006/customXml" ds:itemID="{64DB6A9B-4014-4350-8FE6-F72DA25DFBDF}">
+  <ds:schemaRefs>
+    <ds:schemaRef ds:uri="http://schemas.microsoft.com/sharepoint/v3/contenttype/forms"/>
+  </ds:schemaRefs>
+</ds:datastoreItem>
 </file>
 
-<file path=customXml/item3.xml><?xml version="1.0" encoding="utf-8"?>
-<?mso-contentType ?>
-<FormTemplates xmlns="http://schemas.microsoft.com/sharepoint/v3/contenttype/forms">
-  <Display>DocumentLibraryForm</Display>
-  <Edit>DocumentLibraryForm</Edit>
-  <New>DocumentLibraryForm</New>
-</FormTemplates>
+<file path=customXml/itemProps2.xml><?xml version="1.0" encoding="utf-8"?>
+<ds:datastoreItem xmlns:ds="http://schemas.openxmlformats.org/officeDocument/2006/customXml" ds:itemID="{8A70AF45-36D6-4247-AA7E-6372E9B9F7E1}">
+  <ds:schemaRefs>
+    <ds:schemaRef ds:uri="http://schemas.microsoft.com/office/2006/metadata/properties"/>
+    <ds:schemaRef ds:uri="http://schemas.microsoft.com/office/infopath/2007/PartnerControls"/>
+    <ds:schemaRef ds:uri="b5cf4370-ac38-4b9e-9836-ef6f5df64f24"/>
+    <ds:schemaRef ds:uri="eefa3612-053e-497a-ae76-8a76877f5e22"/>
+  </ds:schemaRefs>
+</ds:datastoreItem>
 </file>
 
-<file path=customXml/itemProps1.xml><?xml version="1.0" encoding="utf-8"?>
+<file path=customXml/itemProps3.xml><?xml version="1.0" encoding="utf-8"?>
 <ds:datastoreItem xmlns:ds="http://schemas.openxmlformats.org/officeDocument/2006/customXml" ds:itemID="{C2099935-ADE8-4E25-82AD-270299869B08}">
   <ds:schemaRefs>
     <ds:schemaRef ds:uri="http://schemas.microsoft.com/office/2006/metadata/contentType"/>
@@ -6201,23 +6313,4 @@
     <ds:schemaRef ds:uri="http://schemas.microsoft.com/internal/obd"/>
   </ds:schemaRefs>
 </ds:datastoreItem>
-</file>
-
-<file path=customXml/itemProps2.xml><?xml version="1.0" encoding="utf-8"?>
-<ds:datastoreItem xmlns:ds="http://schemas.openxmlformats.org/officeDocument/2006/customXml" ds:itemID="{8A70AF45-36D6-4247-AA7E-6372E9B9F7E1}">
-  <ds:schemaRefs>
-    <ds:schemaRef ds:uri="http://schemas.microsoft.com/office/2006/metadata/properties"/>
-    <ds:schemaRef ds:uri="http://schemas.microsoft.com/office/infopath/2007/PartnerControls"/>
-    <ds:schemaRef ds:uri="b5cf4370-ac38-4b9e-9836-ef6f5df64f24"/>
-    <ds:schemaRef ds:uri="eefa3612-053e-497a-ae76-8a76877f5e22"/>
-  </ds:schemaRefs>
-</ds:datastoreItem>
-</file>
-
-<file path=customXml/itemProps3.xml><?xml version="1.0" encoding="utf-8"?>
-<ds:datastoreItem xmlns:ds="http://schemas.openxmlformats.org/officeDocument/2006/customXml" ds:itemID="{64DB6A9B-4014-4350-8FE6-F72DA25DFBDF}">
-  <ds:schemaRefs>
-    <ds:schemaRef ds:uri="http://schemas.microsoft.com/sharepoint/v3/contenttype/forms"/>
-  </ds:schemaRefs>
-</ds:datastoreItem>
 </file>
</xml_diff>